<commit_message>
ready for final test
</commit_message>
<xml_diff>
--- a/presi/2018.04.05.pptx
+++ b/presi/2018.04.05.pptx
@@ -111,6 +111,14 @@
       </a:defRPr>
     </a:lvl9pPr>
   </p:defaultTextStyle>
+  <p:extLst>
+    <p:ext uri="{EFAFB233-063F-42B5-8137-9DF3F51BA10A}">
+      <p15:sldGuideLst xmlns:p15="http://schemas.microsoft.com/office/powerpoint/2012/main"/>
+    </p:ext>
+    <p:ext uri="{2D200454-40CA-4A62-9FC3-DE9A4176ACB9}">
+      <p15:notesGuideLst xmlns:p15="http://schemas.microsoft.com/office/powerpoint/2012/main"/>
+    </p:ext>
+  </p:extLst>
 </p:presentation>
 </file>
 
@@ -208,7 +216,7 @@
           <a:p>
             <a:fld id="{645B675C-7B5D-4234-A74C-2149814839ED}" type="datetimeFigureOut">
               <a:rPr lang="en-US" smtClean="0"/>
-              <a:t>4/4/2019</a:t>
+              <a:t>4/5/2019</a:t>
             </a:fld>
             <a:endParaRPr lang="en-US"/>
           </a:p>
@@ -385,7 +393,7 @@
           <a:p>
             <a:fld id="{FACF1C64-970C-41F0-A732-ACE7B2634E71}" type="datetimeFigureOut">
               <a:rPr lang="en-US" smtClean="0"/>
-              <a:t>4/4/2019</a:t>
+              <a:t>4/5/2019</a:t>
             </a:fld>
             <a:endParaRPr lang="en-US"/>
           </a:p>
@@ -4377,7 +4385,12 @@
             <p:ph type="title"/>
           </p:nvPr>
         </p:nvSpPr>
-        <p:spPr/>
+        <p:spPr>
+          <a:xfrm>
+            <a:off x="838200" y="365126"/>
+            <a:ext cx="10515600" cy="1177267"/>
+          </a:xfrm>
+        </p:spPr>
         <p:txBody>
           <a:bodyPr/>
           <a:lstStyle/>
@@ -4434,7 +4447,12 @@
             <p:ph type="dt" sz="half" idx="10"/>
           </p:nvPr>
         </p:nvSpPr>
-        <p:spPr/>
+        <p:spPr>
+          <a:xfrm>
+            <a:off x="838200" y="6438953"/>
+            <a:ext cx="2743200" cy="365125"/>
+          </a:xfrm>
+        </p:spPr>
         <p:txBody>
           <a:bodyPr/>
           <a:lstStyle/>
@@ -4463,7 +4481,12 @@
             <p:ph type="ftr" sz="quarter" idx="11"/>
           </p:nvPr>
         </p:nvSpPr>
-        <p:spPr/>
+        <p:spPr>
+          <a:xfrm>
+            <a:off x="4038600" y="6438953"/>
+            <a:ext cx="4114800" cy="365125"/>
+          </a:xfrm>
+        </p:spPr>
         <p:txBody>
           <a:bodyPr/>
           <a:lstStyle/>
@@ -4492,7 +4515,12 @@
             <p:ph type="sldNum" sz="quarter" idx="12"/>
           </p:nvPr>
         </p:nvSpPr>
-        <p:spPr/>
+        <p:spPr>
+          <a:xfrm>
+            <a:off x="8610600" y="6438953"/>
+            <a:ext cx="2743200" cy="365125"/>
+          </a:xfrm>
+        </p:spPr>
         <p:txBody>
           <a:bodyPr/>
           <a:lstStyle/>
@@ -4506,6 +4534,36 @@
           </a:p>
         </p:txBody>
       </p:sp>
+      <p:pic>
+        <p:nvPicPr>
+          <p:cNvPr id="4" name="Picture 3">
+            <a:extLst>
+              <a:ext uri="{FF2B5EF4-FFF2-40B4-BE49-F238E27FC236}">
+                <a16:creationId xmlns:a16="http://schemas.microsoft.com/office/drawing/2014/main" id="{C3D4A792-E8F1-4CA7-B9A4-AF90311570D6}"/>
+              </a:ext>
+            </a:extLst>
+          </p:cNvPr>
+          <p:cNvPicPr>
+            <a:picLocks noChangeAspect="1"/>
+          </p:cNvPicPr>
+          <p:nvPr/>
+        </p:nvPicPr>
+        <p:blipFill>
+          <a:blip r:embed="rId3"/>
+          <a:stretch>
+            <a:fillRect/>
+          </a:stretch>
+        </p:blipFill>
+        <p:spPr>
+          <a:xfrm>
+            <a:off x="5843587" y="1968090"/>
+            <a:ext cx="4619625" cy="3295650"/>
+          </a:xfrm>
+          <a:prstGeom prst="rect">
+            <a:avLst/>
+          </a:prstGeom>
+        </p:spPr>
+      </p:pic>
     </p:spTree>
     <p:extLst>
       <p:ext uri="{BB962C8B-B14F-4D97-AF65-F5344CB8AC3E}">

</xml_diff>

<commit_message>
main_RF translated to jupyter notebook
</commit_message>
<xml_diff>
--- a/presi/2018.04.05.pptx
+++ b/presi/2018.04.05.pptx
@@ -4423,8 +4423,8 @@
         </p:blipFill>
         <p:spPr>
           <a:xfrm>
-            <a:off x="838200" y="1968090"/>
-            <a:ext cx="4686300" cy="3400425"/>
+            <a:off x="1262744" y="2078231"/>
+            <a:ext cx="3088741" cy="2241221"/>
           </a:xfrm>
           <a:prstGeom prst="rect">
             <a:avLst/>
@@ -4556,8 +4556,8 @@
         </p:blipFill>
         <p:spPr>
           <a:xfrm>
-            <a:off x="5843587" y="1968090"/>
-            <a:ext cx="4619625" cy="3295650"/>
+            <a:off x="4676638" y="2078231"/>
+            <a:ext cx="3088742" cy="2203515"/>
           </a:xfrm>
           <a:prstGeom prst="rect">
             <a:avLst/>

</xml_diff>